<commit_message>
Model and Experiment Reviewed and done
</commit_message>
<xml_diff>
--- a/tex/figures/ModelAndExperiment/Figures.pptx
+++ b/tex/figures/ModelAndExperiment/Figures.pptx
@@ -244,7 +244,7 @@
           <a:p>
             <a:fld id="{570E8D92-CB03-CD4F-81E9-FA2CA8267CDE}" type="datetimeFigureOut">
               <a:rPr lang="en-US" smtClean="0"/>
-              <a:t>7/10/18</a:t>
+              <a:t>8/16/2018</a:t>
             </a:fld>
             <a:endParaRPr lang="en-US"/>
           </a:p>
@@ -414,7 +414,7 @@
           <a:p>
             <a:fld id="{570E8D92-CB03-CD4F-81E9-FA2CA8267CDE}" type="datetimeFigureOut">
               <a:rPr lang="en-US" smtClean="0"/>
-              <a:t>7/10/18</a:t>
+              <a:t>8/16/2018</a:t>
             </a:fld>
             <a:endParaRPr lang="en-US"/>
           </a:p>
@@ -594,7 +594,7 @@
           <a:p>
             <a:fld id="{570E8D92-CB03-CD4F-81E9-FA2CA8267CDE}" type="datetimeFigureOut">
               <a:rPr lang="en-US" smtClean="0"/>
-              <a:t>7/10/18</a:t>
+              <a:t>8/16/2018</a:t>
             </a:fld>
             <a:endParaRPr lang="en-US"/>
           </a:p>
@@ -764,7 +764,7 @@
           <a:p>
             <a:fld id="{570E8D92-CB03-CD4F-81E9-FA2CA8267CDE}" type="datetimeFigureOut">
               <a:rPr lang="en-US" smtClean="0"/>
-              <a:t>7/10/18</a:t>
+              <a:t>8/16/2018</a:t>
             </a:fld>
             <a:endParaRPr lang="en-US"/>
           </a:p>
@@ -1010,7 +1010,7 @@
           <a:p>
             <a:fld id="{570E8D92-CB03-CD4F-81E9-FA2CA8267CDE}" type="datetimeFigureOut">
               <a:rPr lang="en-US" smtClean="0"/>
-              <a:t>7/10/18</a:t>
+              <a:t>8/16/2018</a:t>
             </a:fld>
             <a:endParaRPr lang="en-US"/>
           </a:p>
@@ -1242,7 +1242,7 @@
           <a:p>
             <a:fld id="{570E8D92-CB03-CD4F-81E9-FA2CA8267CDE}" type="datetimeFigureOut">
               <a:rPr lang="en-US" smtClean="0"/>
-              <a:t>7/10/18</a:t>
+              <a:t>8/16/2018</a:t>
             </a:fld>
             <a:endParaRPr lang="en-US"/>
           </a:p>
@@ -1609,7 +1609,7 @@
           <a:p>
             <a:fld id="{570E8D92-CB03-CD4F-81E9-FA2CA8267CDE}" type="datetimeFigureOut">
               <a:rPr lang="en-US" smtClean="0"/>
-              <a:t>7/10/18</a:t>
+              <a:t>8/16/2018</a:t>
             </a:fld>
             <a:endParaRPr lang="en-US"/>
           </a:p>
@@ -1727,7 +1727,7 @@
           <a:p>
             <a:fld id="{570E8D92-CB03-CD4F-81E9-FA2CA8267CDE}" type="datetimeFigureOut">
               <a:rPr lang="en-US" smtClean="0"/>
-              <a:t>7/10/18</a:t>
+              <a:t>8/16/2018</a:t>
             </a:fld>
             <a:endParaRPr lang="en-US"/>
           </a:p>
@@ -1822,7 +1822,7 @@
           <a:p>
             <a:fld id="{570E8D92-CB03-CD4F-81E9-FA2CA8267CDE}" type="datetimeFigureOut">
               <a:rPr lang="en-US" smtClean="0"/>
-              <a:t>7/10/18</a:t>
+              <a:t>8/16/2018</a:t>
             </a:fld>
             <a:endParaRPr lang="en-US"/>
           </a:p>
@@ -2099,7 +2099,7 @@
           <a:p>
             <a:fld id="{570E8D92-CB03-CD4F-81E9-FA2CA8267CDE}" type="datetimeFigureOut">
               <a:rPr lang="en-US" smtClean="0"/>
-              <a:t>7/10/18</a:t>
+              <a:t>8/16/2018</a:t>
             </a:fld>
             <a:endParaRPr lang="en-US"/>
           </a:p>
@@ -2352,7 +2352,7 @@
           <a:p>
             <a:fld id="{570E8D92-CB03-CD4F-81E9-FA2CA8267CDE}" type="datetimeFigureOut">
               <a:rPr lang="en-US" smtClean="0"/>
-              <a:t>7/10/18</a:t>
+              <a:t>8/16/2018</a:t>
             </a:fld>
             <a:endParaRPr lang="en-US"/>
           </a:p>
@@ -2565,7 +2565,7 @@
           <a:p>
             <a:fld id="{570E8D92-CB03-CD4F-81E9-FA2CA8267CDE}" type="datetimeFigureOut">
               <a:rPr lang="en-US" smtClean="0"/>
-              <a:t>7/10/18</a:t>
+              <a:t>8/16/2018</a:t>
             </a:fld>
             <a:endParaRPr lang="en-US"/>
           </a:p>
@@ -2978,7 +2978,7 @@
         </p:nvGrpSpPr>
         <p:grpSpPr>
           <a:xfrm>
-            <a:off x="619012" y="1592065"/>
+            <a:off x="510987" y="1164360"/>
             <a:ext cx="5297693" cy="3143160"/>
             <a:chOff x="2372509" y="1602822"/>
             <a:chExt cx="5297693" cy="3143160"/>
@@ -3014,8 +3014,8 @@
             </a:prstGeom>
           </p:spPr>
         </p:pic>
-        <mc:AlternateContent xmlns:mc="http://schemas.openxmlformats.org/markup-compatibility/2006" xmlns:a14="http://schemas.microsoft.com/office/drawing/2010/main">
-          <mc:Choice Requires="a14">
+        <mc:AlternateContent xmlns:mc="http://schemas.openxmlformats.org/markup-compatibility/2006">
+          <mc:Choice xmlns:a14="http://schemas.microsoft.com/office/drawing/2010/main" Requires="a14">
             <p:sp>
               <p:nvSpPr>
                 <p:cNvPr id="5" name="TextBox 4"/>
@@ -3046,10 +3046,16 @@
                       </m:oMathParaPr>
                       <m:oMath xmlns:m="http://schemas.openxmlformats.org/officeDocument/2006/math">
                         <m:r>
+                          <a:rPr lang="en-US" b="0" i="1" smtClean="0">
+                            <a:latin typeface="Cambria Math" panose="02040503050406030204" pitchFamily="18" charset="0"/>
+                          </a:rPr>
+                          <m:t>1</m:t>
+                        </m:r>
+                        <m:r>
                           <a:rPr lang="en-CA" b="0" i="1" smtClean="0">
                             <a:latin typeface="Cambria Math" charset="0"/>
                           </a:rPr>
-                          <m:t>2 </m:t>
+                          <m:t> </m:t>
                         </m:r>
                         <m:r>
                           <m:rPr>
@@ -3068,7 +3074,7 @@
               </p:txBody>
             </p:sp>
           </mc:Choice>
-          <mc:Fallback xmlns="">
+          <mc:Fallback>
             <p:sp>
               <p:nvSpPr>
                 <p:cNvPr id="5" name="TextBox 4"/>
@@ -3085,10 +3091,10 @@
                 <a:prstGeom prst="rect">
                   <a:avLst/>
                 </a:prstGeom>
-                <a:blipFill rotWithShape="0">
+                <a:blipFill>
                   <a:blip r:embed="rId3"/>
                   <a:stretch>
-                    <a:fillRect l="-11429" t="-143478" r="-8571" b="-176087"/>
+                    <a:fillRect l="-13043" r="-10145" b="-6522"/>
                   </a:stretch>
                 </a:blipFill>
               </p:spPr>
@@ -3107,8 +3113,8 @@
             </p:sp>
           </mc:Fallback>
         </mc:AlternateContent>
-        <mc:AlternateContent xmlns:mc="http://schemas.openxmlformats.org/markup-compatibility/2006" xmlns:a14="http://schemas.microsoft.com/office/drawing/2010/main">
-          <mc:Choice Requires="a14">
+        <mc:AlternateContent xmlns:mc="http://schemas.openxmlformats.org/markup-compatibility/2006">
+          <mc:Choice xmlns:a14="http://schemas.microsoft.com/office/drawing/2010/main" Requires="a14">
             <p:sp>
               <p:nvSpPr>
                 <p:cNvPr id="6" name="TextBox 5"/>
@@ -3139,10 +3145,16 @@
                       </m:oMathParaPr>
                       <m:oMath xmlns:m="http://schemas.openxmlformats.org/officeDocument/2006/math">
                         <m:r>
+                          <a:rPr lang="en-US" b="0" i="1" smtClean="0">
+                            <a:latin typeface="Cambria Math" panose="02040503050406030204" pitchFamily="18" charset="0"/>
+                          </a:rPr>
+                          <m:t>1</m:t>
+                        </m:r>
+                        <m:r>
                           <a:rPr lang="en-CA" b="0" i="1" smtClean="0">
                             <a:latin typeface="Cambria Math" charset="0"/>
                           </a:rPr>
-                          <m:t>2 </m:t>
+                          <m:t> </m:t>
                         </m:r>
                         <m:r>
                           <m:rPr>
@@ -3161,7 +3173,7 @@
               </p:txBody>
             </p:sp>
           </mc:Choice>
-          <mc:Fallback xmlns="">
+          <mc:Fallback>
             <p:sp>
               <p:nvSpPr>
                 <p:cNvPr id="6" name="TextBox 5"/>
@@ -3178,10 +3190,10 @@
                 <a:prstGeom prst="rect">
                   <a:avLst/>
                 </a:prstGeom>
-                <a:blipFill rotWithShape="0">
-                  <a:blip r:embed="rId3"/>
+                <a:blipFill>
+                  <a:blip r:embed="rId4"/>
                   <a:stretch>
-                    <a:fillRect l="-12857" t="-143478" r="-7143" b="-176087"/>
+                    <a:fillRect l="-13043" r="-10145" b="-6522"/>
                   </a:stretch>
                 </a:blipFill>
               </p:spPr>
@@ -3200,8 +3212,8 @@
             </p:sp>
           </mc:Fallback>
         </mc:AlternateContent>
-        <mc:AlternateContent xmlns:mc="http://schemas.openxmlformats.org/markup-compatibility/2006" xmlns:a14="http://schemas.microsoft.com/office/drawing/2010/main">
-          <mc:Choice Requires="a14">
+        <mc:AlternateContent xmlns:mc="http://schemas.openxmlformats.org/markup-compatibility/2006">
+          <mc:Choice xmlns:a14="http://schemas.microsoft.com/office/drawing/2010/main" Requires="a14">
             <p:sp>
               <p:nvSpPr>
                 <p:cNvPr id="7" name="TextBox 6"/>
@@ -3232,10 +3244,10 @@
                       </m:oMathParaPr>
                       <m:oMath xmlns:m="http://schemas.openxmlformats.org/officeDocument/2006/math">
                         <m:r>
-                          <a:rPr lang="en-CA" i="1">
-                            <a:latin typeface="Cambria Math" charset="0"/>
+                          <a:rPr lang="en-US" b="0" i="1" smtClean="0">
+                            <a:latin typeface="Cambria Math" panose="02040503050406030204" pitchFamily="18" charset="0"/>
                           </a:rPr>
-                          <m:t>5</m:t>
+                          <m:t>3</m:t>
                         </m:r>
                         <m:r>
                           <a:rPr lang="en-CA" b="0" i="1" smtClean="0">
@@ -3260,7 +3272,7 @@
               </p:txBody>
             </p:sp>
           </mc:Choice>
-          <mc:Fallback xmlns="">
+          <mc:Fallback>
             <p:sp>
               <p:nvSpPr>
                 <p:cNvPr id="7" name="TextBox 6"/>
@@ -3277,10 +3289,10 @@
                 <a:prstGeom prst="rect">
                   <a:avLst/>
                 </a:prstGeom>
-                <a:blipFill rotWithShape="0">
-                  <a:blip r:embed="rId4"/>
+                <a:blipFill>
+                  <a:blip r:embed="rId5"/>
                   <a:stretch>
-                    <a:fillRect l="-13043" t="-143478" r="-8696" b="-176087"/>
+                    <a:fillRect l="-11429" r="-8571" b="-6522"/>
                   </a:stretch>
                 </a:blipFill>
               </p:spPr>
@@ -3299,8 +3311,8 @@
             </p:sp>
           </mc:Fallback>
         </mc:AlternateContent>
-        <mc:AlternateContent xmlns:mc="http://schemas.openxmlformats.org/markup-compatibility/2006" xmlns:a14="http://schemas.microsoft.com/office/drawing/2010/main">
-          <mc:Choice Requires="a14">
+        <mc:AlternateContent xmlns:mc="http://schemas.openxmlformats.org/markup-compatibility/2006">
+          <mc:Choice xmlns:a14="http://schemas.microsoft.com/office/drawing/2010/main" Requires="a14">
             <p:sp>
               <p:nvSpPr>
                 <p:cNvPr id="8" name="TextBox 7"/>
@@ -3331,10 +3343,10 @@
                       </m:oMathParaPr>
                       <m:oMath xmlns:m="http://schemas.openxmlformats.org/officeDocument/2006/math">
                         <m:r>
-                          <a:rPr lang="en-CA" i="1" smtClean="0">
-                            <a:latin typeface="Cambria Math" charset="0"/>
+                          <a:rPr lang="en-US" b="0" i="1" smtClean="0">
+                            <a:latin typeface="Cambria Math" panose="02040503050406030204" pitchFamily="18" charset="0"/>
                           </a:rPr>
-                          <m:t>3</m:t>
+                          <m:t>2</m:t>
                         </m:r>
                         <m:r>
                           <a:rPr lang="en-CA" b="0" i="1" smtClean="0">
@@ -3359,7 +3371,7 @@
               </p:txBody>
             </p:sp>
           </mc:Choice>
-          <mc:Fallback xmlns="">
+          <mc:Fallback>
             <p:sp>
               <p:nvSpPr>
                 <p:cNvPr id="8" name="TextBox 7"/>
@@ -3376,10 +3388,10 @@
                 <a:prstGeom prst="rect">
                   <a:avLst/>
                 </a:prstGeom>
-                <a:blipFill rotWithShape="0">
-                  <a:blip r:embed="rId5"/>
+                <a:blipFill>
+                  <a:blip r:embed="rId6"/>
                   <a:stretch>
-                    <a:fillRect l="-11429" t="-148889" r="-8571" b="-180000"/>
+                    <a:fillRect l="-12857" r="-8571" b="-6667"/>
                   </a:stretch>
                 </a:blipFill>
               </p:spPr>
@@ -3570,7 +3582,7 @@
             <p:nvPr/>
           </p:nvPicPr>
           <p:blipFill rotWithShape="1">
-            <a:blip r:embed="rId6">
+            <a:blip r:embed="rId7">
               <a:extLst>
                 <a:ext uri="{28A0092B-C50C-407E-A947-70E740481C1C}">
                   <a14:useLocalDpi xmlns:a14="http://schemas.microsoft.com/office/drawing/2010/main" val="0"/>
@@ -4997,8 +5009,8 @@
             </a:fontRef>
           </p:style>
         </p:cxnSp>
-        <mc:AlternateContent xmlns:mc="http://schemas.openxmlformats.org/markup-compatibility/2006">
-          <mc:Choice xmlns:a14="http://schemas.microsoft.com/office/drawing/2010/main" Requires="a14">
+        <mc:AlternateContent xmlns:mc="http://schemas.openxmlformats.org/markup-compatibility/2006" xmlns:a14="http://schemas.microsoft.com/office/drawing/2010/main">
+          <mc:Choice Requires="a14">
             <p:sp>
               <p:nvSpPr>
                 <p:cNvPr id="48" name="TextBox 47"/>
@@ -5021,6 +5033,7 @@
                 </a:bodyPr>
                 <a:lstStyle/>
                 <a:p>
+                  <a:pPr/>
                   <a14:m>
                     <m:oMathPara xmlns:m="http://schemas.openxmlformats.org/officeDocument/2006/math">
                       <m:oMathParaPr>
@@ -5059,7 +5072,7 @@
               </p:txBody>
             </p:sp>
           </mc:Choice>
-          <mc:Fallback>
+          <mc:Fallback xmlns="">
             <p:sp>
               <p:nvSpPr>
                 <p:cNvPr id="48" name="TextBox 47"/>
@@ -5077,7 +5090,7 @@
                   <a:avLst/>
                 </a:prstGeom>
                 <a:blipFill rotWithShape="0">
-                  <a:blip r:embed="rId7"/>
+                  <a:blip r:embed="rId8"/>
                   <a:stretch>
                     <a:fillRect l="-7595" t="-146667" r="-6329" b="-176667"/>
                   </a:stretch>
@@ -5098,8 +5111,8 @@
             </p:sp>
           </mc:Fallback>
         </mc:AlternateContent>
-        <mc:AlternateContent xmlns:mc="http://schemas.openxmlformats.org/markup-compatibility/2006">
-          <mc:Choice xmlns:a14="http://schemas.microsoft.com/office/drawing/2010/main" Requires="a14">
+        <mc:AlternateContent xmlns:mc="http://schemas.openxmlformats.org/markup-compatibility/2006" xmlns:a14="http://schemas.microsoft.com/office/drawing/2010/main">
+          <mc:Choice Requires="a14">
             <p:sp>
               <p:nvSpPr>
                 <p:cNvPr id="49" name="TextBox 48"/>
@@ -5122,6 +5135,7 @@
                 </a:bodyPr>
                 <a:lstStyle/>
                 <a:p>
+                  <a:pPr/>
                   <a14:m>
                     <m:oMathPara xmlns:m="http://schemas.openxmlformats.org/officeDocument/2006/math">
                       <m:oMathParaPr>
@@ -5160,7 +5174,7 @@
               </p:txBody>
             </p:sp>
           </mc:Choice>
-          <mc:Fallback>
+          <mc:Fallback xmlns="">
             <p:sp>
               <p:nvSpPr>
                 <p:cNvPr id="49" name="TextBox 48"/>
@@ -5178,7 +5192,7 @@
                   <a:avLst/>
                 </a:prstGeom>
                 <a:blipFill rotWithShape="0">
-                  <a:blip r:embed="rId8"/>
+                  <a:blip r:embed="rId9"/>
                   <a:stretch>
                     <a:fillRect l="-170968" t="-7500" r="-138710" b="-5000"/>
                   </a:stretch>
@@ -5236,8 +5250,8 @@
             </a:fontRef>
           </p:style>
         </p:cxnSp>
-        <mc:AlternateContent xmlns:mc="http://schemas.openxmlformats.org/markup-compatibility/2006">
-          <mc:Choice xmlns:a14="http://schemas.microsoft.com/office/drawing/2010/main" Requires="a14">
+        <mc:AlternateContent xmlns:mc="http://schemas.openxmlformats.org/markup-compatibility/2006" xmlns:a14="http://schemas.microsoft.com/office/drawing/2010/main">
+          <mc:Choice Requires="a14">
             <p:sp>
               <p:nvSpPr>
                 <p:cNvPr id="52" name="TextBox 51"/>
@@ -5260,6 +5274,7 @@
                 </a:bodyPr>
                 <a:lstStyle/>
                 <a:p>
+                  <a:pPr/>
                   <a14:m>
                     <m:oMathPara xmlns:m="http://schemas.openxmlformats.org/officeDocument/2006/math">
                       <m:oMathParaPr>
@@ -5298,7 +5313,7 @@
               </p:txBody>
             </p:sp>
           </mc:Choice>
-          <mc:Fallback>
+          <mc:Fallback xmlns="">
             <p:sp>
               <p:nvSpPr>
                 <p:cNvPr id="52" name="TextBox 51"/>
@@ -5316,7 +5331,7 @@
                   <a:avLst/>
                 </a:prstGeom>
                 <a:blipFill rotWithShape="0">
-                  <a:blip r:embed="rId9"/>
+                  <a:blip r:embed="rId10"/>
                   <a:stretch>
                     <a:fillRect l="-13043" t="-146667" r="-8696" b="-176667"/>
                   </a:stretch>
@@ -5337,8 +5352,8 @@
             </p:sp>
           </mc:Fallback>
         </mc:AlternateContent>
-        <mc:AlternateContent xmlns:mc="http://schemas.openxmlformats.org/markup-compatibility/2006">
-          <mc:Choice xmlns:a14="http://schemas.microsoft.com/office/drawing/2010/main" Requires="a14">
+        <mc:AlternateContent xmlns:mc="http://schemas.openxmlformats.org/markup-compatibility/2006" xmlns:a14="http://schemas.microsoft.com/office/drawing/2010/main">
+          <mc:Choice Requires="a14">
             <p:sp>
               <p:nvSpPr>
                 <p:cNvPr id="53" name="TextBox 52"/>
@@ -5361,6 +5376,7 @@
                 </a:bodyPr>
                 <a:lstStyle/>
                 <a:p>
+                  <a:pPr/>
                   <a14:m>
                     <m:oMathPara xmlns:m="http://schemas.openxmlformats.org/officeDocument/2006/math">
                       <m:oMathParaPr>
@@ -5399,7 +5415,7 @@
               </p:txBody>
             </p:sp>
           </mc:Choice>
-          <mc:Fallback>
+          <mc:Fallback xmlns="">
             <p:sp>
               <p:nvSpPr>
                 <p:cNvPr id="53" name="TextBox 52"/>
@@ -5417,7 +5433,7 @@
                   <a:avLst/>
                 </a:prstGeom>
                 <a:blipFill rotWithShape="0">
-                  <a:blip r:embed="rId10"/>
+                  <a:blip r:embed="rId11"/>
                   <a:stretch>
                     <a:fillRect l="-13043" t="-146667" r="-10870" b="-176667"/>
                   </a:stretch>
@@ -5512,8 +5528,8 @@
             </a:fontRef>
           </p:style>
         </p:cxnSp>
-        <mc:AlternateContent xmlns:mc="http://schemas.openxmlformats.org/markup-compatibility/2006">
-          <mc:Choice xmlns:a14="http://schemas.microsoft.com/office/drawing/2010/main" Requires="a14">
+        <mc:AlternateContent xmlns:mc="http://schemas.openxmlformats.org/markup-compatibility/2006" xmlns:a14="http://schemas.microsoft.com/office/drawing/2010/main">
+          <mc:Choice Requires="a14">
             <p:sp>
               <p:nvSpPr>
                 <p:cNvPr id="60" name="TextBox 59"/>
@@ -5536,6 +5552,7 @@
                 </a:bodyPr>
                 <a:lstStyle/>
                 <a:p>
+                  <a:pPr/>
                   <a14:m>
                     <m:oMathPara xmlns:m="http://schemas.openxmlformats.org/officeDocument/2006/math">
                       <m:oMathParaPr>
@@ -5580,7 +5597,7 @@
               </p:txBody>
             </p:sp>
           </mc:Choice>
-          <mc:Fallback>
+          <mc:Fallback xmlns="">
             <p:sp>
               <p:nvSpPr>
                 <p:cNvPr id="60" name="TextBox 59"/>
@@ -5598,7 +5615,7 @@
                   <a:avLst/>
                 </a:prstGeom>
                 <a:blipFill rotWithShape="0">
-                  <a:blip r:embed="rId11"/>
+                  <a:blip r:embed="rId12"/>
                   <a:stretch>
                     <a:fillRect l="-10000" t="-146667" r="-8333" b="-176667"/>
                   </a:stretch>

</xml_diff>